<commit_message>
graphics and updates (moritz)
</commit_message>
<xml_diff>
--- a/presentation/20180325-datafest2018-theresolutemean.pptx
+++ b/presentation/20180325-datafest2018-theresolutemean.pptx
@@ -586,7 +586,7 @@
           <a:p>
             <a:fld id="{B23375D0-788C-463C-9363-76E394C21F96}" type="datetimeFigureOut">
               <a:rPr lang="de-DE" smtClean="0"/>
-              <a:t>24.03.2018</a:t>
+              <a:t>25.03.2018</a:t>
             </a:fld>
             <a:endParaRPr lang="de-DE"/>
           </a:p>
@@ -880,7 +880,7 @@
           <a:p>
             <a:fld id="{B23375D0-788C-463C-9363-76E394C21F96}" type="datetimeFigureOut">
               <a:rPr lang="de-DE" smtClean="0"/>
-              <a:t>24.03.2018</a:t>
+              <a:t>25.03.2018</a:t>
             </a:fld>
             <a:endParaRPr lang="de-DE"/>
           </a:p>
@@ -1066,7 +1066,7 @@
           <a:p>
             <a:fld id="{B23375D0-788C-463C-9363-76E394C21F96}" type="datetimeFigureOut">
               <a:rPr lang="de-DE" smtClean="0"/>
-              <a:t>24.03.2018</a:t>
+              <a:t>25.03.2018</a:t>
             </a:fld>
             <a:endParaRPr lang="de-DE"/>
           </a:p>
@@ -1221,7 +1221,7 @@
           <a:p>
             <a:fld id="{B23375D0-788C-463C-9363-76E394C21F96}" type="datetimeFigureOut">
               <a:rPr lang="de-DE" smtClean="0"/>
-              <a:t>24.03.2018</a:t>
+              <a:t>25.03.2018</a:t>
             </a:fld>
             <a:endParaRPr lang="de-DE"/>
           </a:p>
@@ -1624,7 +1624,7 @@
           <a:p>
             <a:fld id="{B23375D0-788C-463C-9363-76E394C21F96}" type="datetimeFigureOut">
               <a:rPr lang="de-DE" smtClean="0"/>
-              <a:t>24.03.2018</a:t>
+              <a:t>25.03.2018</a:t>
             </a:fld>
             <a:endParaRPr lang="de-DE"/>
           </a:p>
@@ -1839,7 +1839,7 @@
           <a:p>
             <a:fld id="{B23375D0-788C-463C-9363-76E394C21F96}" type="datetimeFigureOut">
               <a:rPr lang="de-DE" smtClean="0"/>
-              <a:t>24.03.2018</a:t>
+              <a:t>25.03.2018</a:t>
             </a:fld>
             <a:endParaRPr lang="de-DE"/>
           </a:p>
@@ -2229,7 +2229,7 @@
           <a:p>
             <a:fld id="{B23375D0-788C-463C-9363-76E394C21F96}" type="datetimeFigureOut">
               <a:rPr lang="de-DE" smtClean="0"/>
-              <a:t>24.03.2018</a:t>
+              <a:t>25.03.2018</a:t>
             </a:fld>
             <a:endParaRPr lang="de-DE"/>
           </a:p>
@@ -2363,7 +2363,7 @@
           <a:p>
             <a:fld id="{B23375D0-788C-463C-9363-76E394C21F96}" type="datetimeFigureOut">
               <a:rPr lang="de-DE" smtClean="0"/>
-              <a:t>24.03.2018</a:t>
+              <a:t>25.03.2018</a:t>
             </a:fld>
             <a:endParaRPr lang="de-DE"/>
           </a:p>
@@ -2497,7 +2497,7 @@
           <a:p>
             <a:fld id="{B23375D0-788C-463C-9363-76E394C21F96}" type="datetimeFigureOut">
               <a:rPr lang="de-DE" smtClean="0"/>
-              <a:t>24.03.2018</a:t>
+              <a:t>25.03.2018</a:t>
             </a:fld>
             <a:endParaRPr lang="de-DE"/>
           </a:p>
@@ -2783,7 +2783,7 @@
           <a:p>
             <a:fld id="{B23375D0-788C-463C-9363-76E394C21F96}" type="datetimeFigureOut">
               <a:rPr lang="de-DE" smtClean="0"/>
-              <a:t>24.03.2018</a:t>
+              <a:t>25.03.2018</a:t>
             </a:fld>
             <a:endParaRPr lang="de-DE"/>
           </a:p>
@@ -3049,7 +3049,7 @@
           <a:p>
             <a:fld id="{B23375D0-788C-463C-9363-76E394C21F96}" type="datetimeFigureOut">
               <a:rPr lang="de-DE" smtClean="0"/>
-              <a:t>24.03.2018</a:t>
+              <a:t>25.03.2018</a:t>
             </a:fld>
             <a:endParaRPr lang="de-DE"/>
           </a:p>
@@ -3263,7 +3263,7 @@
             <a:fld id="{B23375D0-788C-463C-9363-76E394C21F96}" type="datetimeFigureOut">
               <a:rPr lang="de-DE" smtClean="0"/>
               <a:pPr/>
-              <a:t>24.03.2018</a:t>
+              <a:t>25.03.2018</a:t>
             </a:fld>
             <a:endParaRPr lang="de-DE"/>
           </a:p>
@@ -3913,13 +3913,13 @@
         </p:nvSpPr>
         <p:spPr>
           <a:xfrm>
-            <a:off x="609600" y="1752599"/>
+            <a:off x="609600" y="1780478"/>
             <a:ext cx="5410199" cy="1572491"/>
           </a:xfrm>
         </p:spPr>
         <p:txBody>
           <a:bodyPr>
-            <a:normAutofit/>
+            <a:normAutofit fontScale="92500" lnSpcReduction="20000"/>
           </a:bodyPr>
           <a:lstStyle/>
           <a:p>
@@ -4036,6 +4036,65 @@
             <a:r>
               <a:rPr lang="de-DE" sz="2000" dirty="0" err="1"/>
               <a:t>attacks</a:t>
+            </a:r>
+            <a:endParaRPr lang="de-DE" sz="2000" dirty="0"/>
+          </a:p>
+          <a:p>
+            <a:r>
+              <a:rPr lang="de-DE" sz="2000" dirty="0"/>
+              <a:t>Focus on: </a:t>
+            </a:r>
+            <a:r>
+              <a:rPr lang="de-DE" sz="2000" dirty="0" err="1"/>
+              <a:t>Netherlands</a:t>
+            </a:r>
+            <a:r>
+              <a:rPr lang="de-DE" sz="2000" dirty="0"/>
+              <a:t>, United States, Russia, Brazil and China -&gt; Countries </a:t>
+            </a:r>
+            <a:r>
+              <a:rPr lang="de-DE" sz="2000" dirty="0" err="1"/>
+              <a:t>with</a:t>
+            </a:r>
+            <a:r>
+              <a:rPr lang="de-DE" sz="2000" dirty="0"/>
+              <a:t> </a:t>
+            </a:r>
+            <a:r>
+              <a:rPr lang="de-DE" sz="2000" dirty="0" err="1"/>
+              <a:t>most</a:t>
+            </a:r>
+            <a:r>
+              <a:rPr lang="de-DE" sz="2000" dirty="0"/>
+              <a:t> </a:t>
+            </a:r>
+            <a:r>
+              <a:rPr lang="de-DE" sz="2000" dirty="0" err="1"/>
+              <a:t>originated</a:t>
+            </a:r>
+            <a:r>
+              <a:rPr lang="de-DE" sz="2000" dirty="0"/>
+              <a:t> IP </a:t>
+            </a:r>
+            <a:r>
+              <a:rPr lang="de-DE" sz="2000" dirty="0" err="1"/>
+              <a:t>adresses</a:t>
+            </a:r>
+            <a:r>
+              <a:rPr lang="de-DE" sz="2000" dirty="0"/>
+              <a:t> in </a:t>
+            </a:r>
+            <a:r>
+              <a:rPr lang="de-DE" sz="2000" dirty="0" err="1"/>
+              <a:t>the</a:t>
+            </a:r>
+            <a:r>
+              <a:rPr lang="de-DE" sz="2000" dirty="0"/>
+              <a:t> </a:t>
+            </a:r>
+            <a:r>
+              <a:rPr lang="de-DE" sz="2000" dirty="0" err="1"/>
+              <a:t>data</a:t>
             </a:r>
             <a:endParaRPr lang="de-DE" sz="2000" dirty="0"/>
           </a:p>
@@ -4057,7 +4116,12 @@
             <p:ph type="title"/>
           </p:nvPr>
         </p:nvSpPr>
-        <p:spPr/>
+        <p:spPr>
+          <a:xfrm>
+            <a:off x="630375" y="912610"/>
+            <a:ext cx="10931250" cy="525697"/>
+          </a:xfrm>
+        </p:spPr>
         <p:txBody>
           <a:bodyPr>
             <a:normAutofit fontScale="90000"/>
@@ -4068,6 +4132,9 @@
               <a:rPr lang="de-DE" dirty="0"/>
               <a:t>Server Security &amp; </a:t>
             </a:r>
+            <a:br>
+              <a:rPr lang="de-DE" dirty="0"/>
+            </a:br>
             <a:r>
               <a:rPr lang="de-DE" dirty="0" err="1"/>
               <a:t>Cyber</a:t>
@@ -4142,14 +4209,539 @@
         </p:blipFill>
         <p:spPr>
           <a:xfrm>
-            <a:off x="4094700" y="-422564"/>
-            <a:ext cx="7487700" cy="4246418"/>
+            <a:off x="6975087" y="1198894"/>
+            <a:ext cx="4607313" cy="2612896"/>
           </a:xfrm>
           <a:prstGeom prst="rect">
             <a:avLst/>
           </a:prstGeom>
         </p:spPr>
       </p:pic>
+      <p:sp>
+        <p:nvSpPr>
+          <p:cNvPr id="3" name="Rechteck 2">
+            <a:extLst>
+              <a:ext uri="{FF2B5EF4-FFF2-40B4-BE49-F238E27FC236}">
+                <a16:creationId xmlns:a16="http://schemas.microsoft.com/office/drawing/2014/main" id="{BEB9EF76-EA8A-49FD-8D3E-80B9F5C32BB3}"/>
+              </a:ext>
+            </a:extLst>
+          </p:cNvPr>
+          <p:cNvSpPr/>
+          <p:nvPr/>
+        </p:nvSpPr>
+        <p:spPr>
+          <a:xfrm>
+            <a:off x="3155795" y="1198894"/>
+            <a:ext cx="4694664" cy="2306138"/>
+          </a:xfrm>
+          <a:prstGeom prst="rect">
+            <a:avLst/>
+          </a:prstGeom>
+          <a:solidFill>
+            <a:srgbClr val="FFFF00"/>
+          </a:solidFill>
+        </p:spPr>
+        <p:style>
+          <a:lnRef idx="2">
+            <a:schemeClr val="accent1">
+              <a:shade val="50000"/>
+            </a:schemeClr>
+          </a:lnRef>
+          <a:fillRef idx="1">
+            <a:schemeClr val="accent1"/>
+          </a:fillRef>
+          <a:effectRef idx="0">
+            <a:schemeClr val="accent1"/>
+          </a:effectRef>
+          <a:fontRef idx="minor">
+            <a:schemeClr val="lt1"/>
+          </a:fontRef>
+        </p:style>
+        <p:txBody>
+          <a:bodyPr rtlCol="0" anchor="ctr"/>
+          <a:lstStyle/>
+          <a:p>
+            <a:pPr marL="285750" indent="-285750">
+              <a:buFontTx/>
+              <a:buChar char="-"/>
+            </a:pPr>
+            <a:r>
+              <a:rPr lang="de-DE" dirty="0" err="1">
+                <a:solidFill>
+                  <a:schemeClr val="tx1"/>
+                </a:solidFill>
+              </a:rPr>
+              <a:t>Make</a:t>
+            </a:r>
+            <a:r>
+              <a:rPr lang="de-DE" dirty="0">
+                <a:solidFill>
+                  <a:schemeClr val="tx1"/>
+                </a:solidFill>
+              </a:rPr>
+              <a:t> </a:t>
+            </a:r>
+            <a:r>
+              <a:rPr lang="de-DE" dirty="0" err="1">
+                <a:solidFill>
+                  <a:schemeClr val="tx1"/>
+                </a:solidFill>
+              </a:rPr>
+              <a:t>heatmap</a:t>
+            </a:r>
+            <a:r>
+              <a:rPr lang="de-DE" dirty="0">
+                <a:solidFill>
+                  <a:schemeClr val="tx1"/>
+                </a:solidFill>
+              </a:rPr>
+              <a:t> </a:t>
+            </a:r>
+            <a:r>
+              <a:rPr lang="de-DE" dirty="0" err="1">
+                <a:solidFill>
+                  <a:schemeClr val="tx1"/>
+                </a:solidFill>
+              </a:rPr>
+              <a:t>nicer</a:t>
+            </a:r>
+            <a:endParaRPr lang="de-DE" dirty="0">
+              <a:solidFill>
+                <a:schemeClr val="tx1"/>
+              </a:solidFill>
+            </a:endParaRPr>
+          </a:p>
+          <a:p>
+            <a:pPr marL="285750" indent="-285750">
+              <a:buFontTx/>
+              <a:buChar char="-"/>
+            </a:pPr>
+            <a:r>
+              <a:rPr lang="de-DE" dirty="0" err="1">
+                <a:solidFill>
+                  <a:schemeClr val="tx1"/>
+                </a:solidFill>
+              </a:rPr>
+              <a:t>Include</a:t>
+            </a:r>
+            <a:r>
+              <a:rPr lang="de-DE" dirty="0">
+                <a:solidFill>
+                  <a:schemeClr val="tx1"/>
+                </a:solidFill>
+              </a:rPr>
+              <a:t> nice </a:t>
+            </a:r>
+            <a:r>
+              <a:rPr lang="de-DE" dirty="0" err="1">
+                <a:solidFill>
+                  <a:schemeClr val="tx1"/>
+                </a:solidFill>
+              </a:rPr>
+              <a:t>story</a:t>
+            </a:r>
+            <a:r>
+              <a:rPr lang="de-DE" dirty="0">
+                <a:solidFill>
+                  <a:schemeClr val="tx1"/>
+                </a:solidFill>
+              </a:rPr>
+              <a:t> </a:t>
+            </a:r>
+            <a:r>
+              <a:rPr lang="de-DE" dirty="0" err="1">
+                <a:solidFill>
+                  <a:schemeClr val="tx1"/>
+                </a:solidFill>
+              </a:rPr>
+              <a:t>text</a:t>
+            </a:r>
+            <a:r>
+              <a:rPr lang="de-DE" dirty="0">
+                <a:solidFill>
+                  <a:schemeClr val="tx1"/>
+                </a:solidFill>
+              </a:rPr>
+              <a:t>/</a:t>
+            </a:r>
+            <a:r>
+              <a:rPr lang="de-DE" dirty="0" err="1">
+                <a:solidFill>
+                  <a:schemeClr val="tx1"/>
+                </a:solidFill>
+              </a:rPr>
+              <a:t>bullet</a:t>
+            </a:r>
+            <a:r>
+              <a:rPr lang="de-DE" dirty="0">
+                <a:solidFill>
+                  <a:schemeClr val="tx1"/>
+                </a:solidFill>
+              </a:rPr>
+              <a:t> </a:t>
+            </a:r>
+            <a:r>
+              <a:rPr lang="de-DE" dirty="0" err="1">
+                <a:solidFill>
+                  <a:schemeClr val="tx1"/>
+                </a:solidFill>
+              </a:rPr>
+              <a:t>points</a:t>
+            </a:r>
+            <a:endParaRPr lang="de-DE" dirty="0">
+              <a:solidFill>
+                <a:schemeClr val="tx1"/>
+              </a:solidFill>
+            </a:endParaRPr>
+          </a:p>
+          <a:p>
+            <a:pPr marL="285750" indent="-285750">
+              <a:buFontTx/>
+              <a:buChar char="-"/>
+            </a:pPr>
+            <a:r>
+              <a:rPr lang="de-DE" dirty="0" err="1">
+                <a:solidFill>
+                  <a:schemeClr val="tx1"/>
+                </a:solidFill>
+              </a:rPr>
+              <a:t>Adjust</a:t>
+            </a:r>
+            <a:r>
+              <a:rPr lang="de-DE" dirty="0">
+                <a:solidFill>
+                  <a:schemeClr val="tx1"/>
+                </a:solidFill>
+              </a:rPr>
+              <a:t> </a:t>
+            </a:r>
+            <a:r>
+              <a:rPr lang="de-DE" dirty="0" err="1">
+                <a:solidFill>
+                  <a:schemeClr val="tx1"/>
+                </a:solidFill>
+              </a:rPr>
+              <a:t>colors</a:t>
+            </a:r>
+            <a:r>
+              <a:rPr lang="de-DE" dirty="0">
+                <a:solidFill>
+                  <a:schemeClr val="tx1"/>
+                </a:solidFill>
+              </a:rPr>
+              <a:t> </a:t>
+            </a:r>
+            <a:r>
+              <a:rPr lang="de-DE" dirty="0" err="1">
+                <a:solidFill>
+                  <a:schemeClr val="tx1"/>
+                </a:solidFill>
+              </a:rPr>
+              <a:t>to</a:t>
+            </a:r>
+            <a:r>
+              <a:rPr lang="de-DE" dirty="0">
+                <a:solidFill>
+                  <a:schemeClr val="tx1"/>
+                </a:solidFill>
+              </a:rPr>
+              <a:t> uniform </a:t>
+            </a:r>
+            <a:r>
+              <a:rPr lang="de-DE" dirty="0" err="1">
+                <a:solidFill>
+                  <a:schemeClr val="tx1"/>
+                </a:solidFill>
+              </a:rPr>
+              <a:t>coloring</a:t>
+            </a:r>
+            <a:r>
+              <a:rPr lang="de-DE" dirty="0">
+                <a:solidFill>
+                  <a:schemeClr val="tx1"/>
+                </a:solidFill>
+              </a:rPr>
+              <a:t> </a:t>
+            </a:r>
+            <a:r>
+              <a:rPr lang="de-DE" dirty="0" err="1">
+                <a:solidFill>
+                  <a:schemeClr val="tx1"/>
+                </a:solidFill>
+              </a:rPr>
+              <a:t>of</a:t>
+            </a:r>
+            <a:r>
+              <a:rPr lang="de-DE" dirty="0">
+                <a:solidFill>
+                  <a:schemeClr val="tx1"/>
+                </a:solidFill>
+              </a:rPr>
+              <a:t> </a:t>
+            </a:r>
+            <a:r>
+              <a:rPr lang="de-DE" dirty="0" err="1">
+                <a:solidFill>
+                  <a:schemeClr val="tx1"/>
+                </a:solidFill>
+              </a:rPr>
+              <a:t>graphics</a:t>
+            </a:r>
+            <a:r>
+              <a:rPr lang="de-DE" dirty="0">
+                <a:solidFill>
+                  <a:schemeClr val="tx1"/>
+                </a:solidFill>
+              </a:rPr>
+              <a:t> (e.g. nice </a:t>
+            </a:r>
+            <a:r>
+              <a:rPr lang="de-DE" dirty="0" err="1">
+                <a:solidFill>
+                  <a:schemeClr val="tx1"/>
+                </a:solidFill>
+              </a:rPr>
+              <a:t>blue</a:t>
+            </a:r>
+            <a:r>
+              <a:rPr lang="de-DE" dirty="0">
+                <a:solidFill>
+                  <a:schemeClr val="tx1"/>
+                </a:solidFill>
+              </a:rPr>
+              <a:t> </a:t>
+            </a:r>
+            <a:r>
+              <a:rPr lang="de-DE" dirty="0" err="1">
+                <a:solidFill>
+                  <a:schemeClr val="tx1"/>
+                </a:solidFill>
+              </a:rPr>
+              <a:t>scales</a:t>
+            </a:r>
+            <a:r>
+              <a:rPr lang="de-DE" dirty="0">
+                <a:solidFill>
+                  <a:schemeClr val="tx1"/>
+                </a:solidFill>
+              </a:rPr>
+              <a:t> </a:t>
+            </a:r>
+            <a:r>
+              <a:rPr lang="de-DE" dirty="0" err="1">
+                <a:solidFill>
+                  <a:schemeClr val="tx1"/>
+                </a:solidFill>
+              </a:rPr>
+              <a:t>or</a:t>
+            </a:r>
+            <a:r>
+              <a:rPr lang="de-DE" dirty="0">
+                <a:solidFill>
+                  <a:schemeClr val="tx1"/>
+                </a:solidFill>
+              </a:rPr>
+              <a:t> </a:t>
+            </a:r>
+            <a:r>
+              <a:rPr lang="de-DE" dirty="0" err="1">
+                <a:solidFill>
+                  <a:schemeClr val="tx1"/>
+                </a:solidFill>
+              </a:rPr>
+              <a:t>something</a:t>
+            </a:r>
+            <a:r>
+              <a:rPr lang="de-DE" dirty="0">
+                <a:solidFill>
+                  <a:schemeClr val="tx1"/>
+                </a:solidFill>
+              </a:rPr>
+              <a:t>)</a:t>
+            </a:r>
+          </a:p>
+          <a:p>
+            <a:pPr marL="285750" indent="-285750">
+              <a:buFontTx/>
+              <a:buChar char="-"/>
+            </a:pPr>
+            <a:r>
+              <a:rPr lang="de-DE" dirty="0">
+                <a:solidFill>
+                  <a:schemeClr val="tx1"/>
+                </a:solidFill>
+              </a:rPr>
+              <a:t>Order </a:t>
+            </a:r>
+            <a:r>
+              <a:rPr lang="de-DE" dirty="0" err="1">
+                <a:solidFill>
+                  <a:schemeClr val="tx1"/>
+                </a:solidFill>
+              </a:rPr>
+              <a:t>graphics</a:t>
+            </a:r>
+            <a:r>
+              <a:rPr lang="de-DE" dirty="0">
+                <a:solidFill>
+                  <a:schemeClr val="tx1"/>
+                </a:solidFill>
+              </a:rPr>
+              <a:t> and </a:t>
+            </a:r>
+            <a:r>
+              <a:rPr lang="de-DE" dirty="0" err="1">
+                <a:solidFill>
+                  <a:schemeClr val="tx1"/>
+                </a:solidFill>
+              </a:rPr>
+              <a:t>text</a:t>
+            </a:r>
+            <a:r>
+              <a:rPr lang="de-DE" dirty="0">
+                <a:solidFill>
+                  <a:schemeClr val="tx1"/>
+                </a:solidFill>
+              </a:rPr>
+              <a:t> </a:t>
+            </a:r>
+            <a:r>
+              <a:rPr lang="de-DE" dirty="0" err="1">
+                <a:solidFill>
+                  <a:schemeClr val="tx1"/>
+                </a:solidFill>
+              </a:rPr>
+              <a:t>nicely</a:t>
+            </a:r>
+            <a:r>
+              <a:rPr lang="de-DE" dirty="0">
+                <a:solidFill>
+                  <a:schemeClr val="tx1"/>
+                </a:solidFill>
+              </a:rPr>
+              <a:t> on </a:t>
+            </a:r>
+            <a:r>
+              <a:rPr lang="de-DE" dirty="0" err="1">
+                <a:solidFill>
+                  <a:schemeClr val="tx1"/>
+                </a:solidFill>
+              </a:rPr>
+              <a:t>the</a:t>
+            </a:r>
+            <a:r>
+              <a:rPr lang="de-DE" dirty="0">
+                <a:solidFill>
+                  <a:schemeClr val="tx1"/>
+                </a:solidFill>
+              </a:rPr>
+              <a:t> </a:t>
+            </a:r>
+            <a:r>
+              <a:rPr lang="de-DE" dirty="0" err="1">
+                <a:solidFill>
+                  <a:schemeClr val="tx1"/>
+                </a:solidFill>
+              </a:rPr>
+              <a:t>slides</a:t>
+            </a:r>
+            <a:endParaRPr lang="de-DE" dirty="0">
+              <a:solidFill>
+                <a:schemeClr val="tx1"/>
+              </a:solidFill>
+            </a:endParaRPr>
+          </a:p>
+          <a:p>
+            <a:pPr marL="285750" indent="-285750">
+              <a:buFontTx/>
+              <a:buChar char="-"/>
+            </a:pPr>
+            <a:r>
+              <a:rPr lang="de-DE" dirty="0">
+                <a:solidFill>
+                  <a:schemeClr val="tx1"/>
+                </a:solidFill>
+              </a:rPr>
+              <a:t>Maybe </a:t>
+            </a:r>
+            <a:r>
+              <a:rPr lang="de-DE" dirty="0" err="1">
+                <a:solidFill>
+                  <a:schemeClr val="tx1"/>
+                </a:solidFill>
+              </a:rPr>
+              <a:t>include</a:t>
+            </a:r>
+            <a:r>
+              <a:rPr lang="de-DE" dirty="0">
+                <a:solidFill>
+                  <a:schemeClr val="tx1"/>
+                </a:solidFill>
+              </a:rPr>
+              <a:t> </a:t>
+            </a:r>
+            <a:r>
+              <a:rPr lang="de-DE" dirty="0" err="1">
+                <a:solidFill>
+                  <a:schemeClr val="tx1"/>
+                </a:solidFill>
+              </a:rPr>
+              <a:t>background</a:t>
+            </a:r>
+            <a:r>
+              <a:rPr lang="de-DE" dirty="0">
+                <a:solidFill>
+                  <a:schemeClr val="tx1"/>
+                </a:solidFill>
+              </a:rPr>
+              <a:t> </a:t>
+            </a:r>
+            <a:r>
+              <a:rPr lang="de-DE" dirty="0" err="1">
+                <a:solidFill>
+                  <a:schemeClr val="tx1"/>
+                </a:solidFill>
+              </a:rPr>
+              <a:t>color</a:t>
+            </a:r>
+            <a:r>
+              <a:rPr lang="de-DE" dirty="0">
+                <a:solidFill>
+                  <a:schemeClr val="tx1"/>
+                </a:solidFill>
+              </a:rPr>
+              <a:t> on </a:t>
+            </a:r>
+            <a:r>
+              <a:rPr lang="de-DE" dirty="0" err="1">
+                <a:solidFill>
+                  <a:schemeClr val="tx1"/>
+                </a:solidFill>
+              </a:rPr>
+              <a:t>slides</a:t>
+            </a:r>
+            <a:r>
+              <a:rPr lang="de-DE" dirty="0">
+                <a:solidFill>
+                  <a:schemeClr val="tx1"/>
+                </a:solidFill>
+              </a:rPr>
+              <a:t>?</a:t>
+            </a:r>
+          </a:p>
+          <a:p>
+            <a:pPr marL="285750" indent="-285750">
+              <a:buFontTx/>
+              <a:buChar char="-"/>
+            </a:pPr>
+            <a:endParaRPr lang="de-DE" dirty="0">
+              <a:solidFill>
+                <a:schemeClr val="tx1"/>
+              </a:solidFill>
+            </a:endParaRPr>
+          </a:p>
+        </p:txBody>
+      </p:sp>
     </p:spTree>
     <p:extLst>
       <p:ext uri="{BB962C8B-B14F-4D97-AF65-F5344CB8AC3E}">
@@ -4182,31 +4774,6 @@
       </p:grpSpPr>
       <p:sp>
         <p:nvSpPr>
-          <p:cNvPr id="6" name="Inhaltsplatzhalter 5">
-            <a:extLst>
-              <a:ext uri="{FF2B5EF4-FFF2-40B4-BE49-F238E27FC236}">
-                <a16:creationId xmlns:a16="http://schemas.microsoft.com/office/drawing/2014/main" id="{164207C4-10EC-47CD-A4C8-476CD2689AC3}"/>
-              </a:ext>
-            </a:extLst>
-          </p:cNvPr>
-          <p:cNvSpPr>
-            <a:spLocks noGrp="1"/>
-          </p:cNvSpPr>
-          <p:nvPr>
-            <p:ph idx="1"/>
-          </p:nvPr>
-        </p:nvSpPr>
-        <p:spPr/>
-        <p:txBody>
-          <a:bodyPr/>
-          <a:lstStyle/>
-          <a:p>
-            <a:endParaRPr lang="de-DE" dirty="0"/>
-          </a:p>
-        </p:txBody>
-      </p:sp>
-      <p:sp>
-        <p:nvSpPr>
           <p:cNvPr id="7" name="Titel 6">
             <a:extLst>
               <a:ext uri="{FF2B5EF4-FFF2-40B4-BE49-F238E27FC236}">
@@ -4250,11 +4817,82 @@
             </a:r>
             <a:r>
               <a:rPr lang="de-DE" dirty="0"/>
-              <a:t> Countries</a:t>
-            </a:r>
-          </a:p>
-        </p:txBody>
-      </p:sp>
+              <a:t> Top 5 Countries</a:t>
+            </a:r>
+          </a:p>
+        </p:txBody>
+      </p:sp>
+      <p:pic>
+        <p:nvPicPr>
+          <p:cNvPr id="21" name="Grafik 20" descr="Ein Bild, das Text enthält.&#10;&#10;Mit hoher Zuverlässigkeit generierte Beschreibung">
+            <a:extLst>
+              <a:ext uri="{FF2B5EF4-FFF2-40B4-BE49-F238E27FC236}">
+                <a16:creationId xmlns:a16="http://schemas.microsoft.com/office/drawing/2014/main" id="{23324DCD-B9B1-471A-B550-3B5530B11EC6}"/>
+              </a:ext>
+            </a:extLst>
+          </p:cNvPr>
+          <p:cNvPicPr>
+            <a:picLocks noChangeAspect="1"/>
+          </p:cNvPicPr>
+          <p:nvPr/>
+        </p:nvPicPr>
+        <p:blipFill>
+          <a:blip r:embed="rId2">
+            <a:extLst>
+              <a:ext uri="{28A0092B-C50C-407E-A947-70E740481C1C}">
+                <a14:useLocalDpi xmlns:a14="http://schemas.microsoft.com/office/drawing/2010/main" val="0"/>
+              </a:ext>
+            </a:extLst>
+          </a:blip>
+          <a:stretch>
+            <a:fillRect/>
+          </a:stretch>
+        </p:blipFill>
+        <p:spPr>
+          <a:xfrm>
+            <a:off x="406931" y="3445727"/>
+            <a:ext cx="6945269" cy="3194824"/>
+          </a:xfrm>
+          <a:prstGeom prst="rect">
+            <a:avLst/>
+          </a:prstGeom>
+        </p:spPr>
+      </p:pic>
+      <p:pic>
+        <p:nvPicPr>
+          <p:cNvPr id="15" name="Inhaltsplatzhalter 14" descr="Ein Bild, das Text, Karte, Screenshot enthält.&#10;&#10;Mit hoher Zuverlässigkeit generierte Beschreibung">
+            <a:extLst>
+              <a:ext uri="{FF2B5EF4-FFF2-40B4-BE49-F238E27FC236}">
+                <a16:creationId xmlns:a16="http://schemas.microsoft.com/office/drawing/2014/main" id="{19392A9B-4ECD-4256-9C2D-1DEE308DC1C4}"/>
+              </a:ext>
+            </a:extLst>
+          </p:cNvPr>
+          <p:cNvPicPr>
+            <a:picLocks noGrp="1" noChangeAspect="1"/>
+          </p:cNvPicPr>
+          <p:nvPr>
+            <p:ph idx="1"/>
+          </p:nvPr>
+        </p:nvPicPr>
+        <p:blipFill>
+          <a:blip r:embed="rId3">
+            <a:extLst>
+              <a:ext uri="{28A0092B-C50C-407E-A947-70E740481C1C}">
+                <a14:useLocalDpi xmlns:a14="http://schemas.microsoft.com/office/drawing/2010/main" val="0"/>
+              </a:ext>
+            </a:extLst>
+          </a:blip>
+          <a:stretch>
+            <a:fillRect/>
+          </a:stretch>
+        </p:blipFill>
+        <p:spPr>
+          <a:xfrm>
+            <a:off x="5962185" y="1430081"/>
+            <a:ext cx="6096000" cy="2804160"/>
+          </a:xfrm>
+        </p:spPr>
+      </p:pic>
     </p:spTree>
     <p:extLst>
       <p:ext uri="{BB962C8B-B14F-4D97-AF65-F5344CB8AC3E}">

</xml_diff>